<commit_message>
Completed my sections for IPR2.
</commit_message>
<xml_diff>
--- a/SE4151/IPR/IPR 2_Team 1_Presentation Template_.pptx
+++ b/SE4151/IPR/IPR 2_Team 1_Presentation Template_.pptx
@@ -206,7 +206,7 @@
             <a:fld id="{EA899A6E-8B33-452A-B25B-6664C34F238C}" type="datetimeFigureOut">
               <a:rPr lang="en-US" smtClean="0"/>
               <a:pPr/>
-              <a:t>8/30/2012</a:t>
+              <a:t>9/3/12</a:t>
             </a:fld>
             <a:endParaRPr lang="en-US"/>
           </a:p>
@@ -780,6 +780,14 @@
           </a:bodyPr>
           <a:lstStyle/>
           <a:p>
+            <a:r>
+              <a:rPr lang="en-US" dirty="0" smtClean="0"/>
+              <a:t>“Operator personnel requirements are derived through the human factors analysis, particularly through the generation of the</a:t>
+            </a:r>
+            <a:r>
+              <a:rPr lang="en-US" baseline="0" dirty="0" smtClean="0"/>
+              <a:t> detailed operator task analysis and operational sequence diagrams.  Maintenance personnel requirements evolve from the maintainability analysis, the supportability analysis and the detail maintenance task analysis.” (B&amp;F, pg. 492)</a:t>
+            </a:r>
             <a:endParaRPr lang="en-US" dirty="0"/>
           </a:p>
         </p:txBody>
@@ -987,21 +995,12 @@
             </a:r>
             <a:r>
               <a:rPr lang="en-US" dirty="0" smtClean="0"/>
-              <a:t>top </a:t>
-            </a:r>
-            <a:r>
-              <a:rPr lang="en-US" dirty="0" smtClean="0"/>
-              <a:t>level required</a:t>
+              <a:t>top level required</a:t>
             </a:r>
             <a:r>
               <a:rPr lang="en-US" baseline="0" dirty="0" smtClean="0"/>
-              <a:t> capabilities of the JIPS program are as follows</a:t>
-            </a:r>
-            <a:r>
-              <a:rPr lang="en-US" baseline="0" dirty="0" smtClean="0"/>
-              <a:t>: (see above)</a:t>
-            </a:r>
-            <a:endParaRPr lang="en-US" baseline="0" dirty="0" smtClean="0"/>
+              <a:t> capabilities of the JIPS program are as follows: (see above)</a:t>
+            </a:r>
           </a:p>
           <a:p>
             <a:endParaRPr lang="en-US" baseline="0" dirty="0" smtClean="0"/>
@@ -2189,7 +2188,7 @@
             <a:fld id="{E9B8014F-4AA0-4B8F-8EFE-46818A9A37F3}" type="datetimeFigureOut">
               <a:rPr lang="en-US" smtClean="0"/>
               <a:pPr/>
-              <a:t>8/30/2012</a:t>
+              <a:t>9/3/12</a:t>
             </a:fld>
             <a:endParaRPr lang="en-US" dirty="0"/>
           </a:p>
@@ -2390,7 +2389,7 @@
             <a:fld id="{E9B8014F-4AA0-4B8F-8EFE-46818A9A37F3}" type="datetimeFigureOut">
               <a:rPr lang="en-US" smtClean="0"/>
               <a:pPr/>
-              <a:t>8/30/2012</a:t>
+              <a:t>9/3/12</a:t>
             </a:fld>
             <a:endParaRPr lang="en-US" dirty="0"/>
           </a:p>
@@ -2582,7 +2581,7 @@
             <a:fld id="{E9B8014F-4AA0-4B8F-8EFE-46818A9A37F3}" type="datetimeFigureOut">
               <a:rPr lang="en-US" smtClean="0"/>
               <a:pPr/>
-              <a:t>8/30/2012</a:t>
+              <a:t>9/3/12</a:t>
             </a:fld>
             <a:endParaRPr lang="en-US" dirty="0"/>
           </a:p>
@@ -2776,7 +2775,7 @@
             <a:fld id="{E9B8014F-4AA0-4B8F-8EFE-46818A9A37F3}" type="datetimeFigureOut">
               <a:rPr lang="en-US" smtClean="0"/>
               <a:pPr/>
-              <a:t>8/30/2012</a:t>
+              <a:t>9/3/12</a:t>
             </a:fld>
             <a:endParaRPr lang="en-US" dirty="0"/>
           </a:p>
@@ -3004,7 +3003,7 @@
             <a:fld id="{E9B8014F-4AA0-4B8F-8EFE-46818A9A37F3}" type="datetimeFigureOut">
               <a:rPr lang="en-US" smtClean="0"/>
               <a:pPr/>
-              <a:t>8/30/2012</a:t>
+              <a:t>9/3/12</a:t>
             </a:fld>
             <a:endParaRPr lang="en-US" dirty="0"/>
           </a:p>
@@ -3297,7 +3296,7 @@
             <a:fld id="{E9B8014F-4AA0-4B8F-8EFE-46818A9A37F3}" type="datetimeFigureOut">
               <a:rPr lang="en-US" smtClean="0"/>
               <a:pPr/>
-              <a:t>8/30/2012</a:t>
+              <a:t>9/3/12</a:t>
             </a:fld>
             <a:endParaRPr lang="en-US" dirty="0"/>
           </a:p>
@@ -3730,7 +3729,7 @@
             <a:fld id="{E9B8014F-4AA0-4B8F-8EFE-46818A9A37F3}" type="datetimeFigureOut">
               <a:rPr lang="en-US" smtClean="0"/>
               <a:pPr/>
-              <a:t>8/30/2012</a:t>
+              <a:t>9/3/12</a:t>
             </a:fld>
             <a:endParaRPr lang="en-US" dirty="0"/>
           </a:p>
@@ -3858,7 +3857,7 @@
             <a:fld id="{E9B8014F-4AA0-4B8F-8EFE-46818A9A37F3}" type="datetimeFigureOut">
               <a:rPr lang="en-US" smtClean="0"/>
               <a:pPr/>
-              <a:t>8/30/2012</a:t>
+              <a:t>9/3/12</a:t>
             </a:fld>
             <a:endParaRPr lang="en-US" dirty="0"/>
           </a:p>
@@ -3963,7 +3962,7 @@
             <a:fld id="{E9B8014F-4AA0-4B8F-8EFE-46818A9A37F3}" type="datetimeFigureOut">
               <a:rPr lang="en-US" smtClean="0"/>
               <a:pPr/>
-              <a:t>8/30/2012</a:t>
+              <a:t>9/3/12</a:t>
             </a:fld>
             <a:endParaRPr lang="en-US" dirty="0"/>
           </a:p>
@@ -4234,7 +4233,7 @@
             <a:fld id="{E9B8014F-4AA0-4B8F-8EFE-46818A9A37F3}" type="datetimeFigureOut">
               <a:rPr lang="en-US" smtClean="0"/>
               <a:pPr/>
-              <a:t>8/30/2012</a:t>
+              <a:t>9/3/12</a:t>
             </a:fld>
             <a:endParaRPr lang="en-US" dirty="0"/>
           </a:p>
@@ -4600,7 +4599,7 @@
             <a:fld id="{E9B8014F-4AA0-4B8F-8EFE-46818A9A37F3}" type="datetimeFigureOut">
               <a:rPr lang="en-US" smtClean="0"/>
               <a:pPr/>
-              <a:t>8/30/2012</a:t>
+              <a:t>9/3/12</a:t>
             </a:fld>
             <a:endParaRPr lang="en-US" dirty="0"/>
           </a:p>
@@ -4957,7 +4956,7 @@
             <a:fld id="{E9B8014F-4AA0-4B8F-8EFE-46818A9A37F3}" type="datetimeFigureOut">
               <a:rPr lang="en-US" smtClean="0"/>
               <a:pPr/>
-              <a:t>8/30/2012</a:t>
+              <a:t>9/3/12</a:t>
             </a:fld>
             <a:endParaRPr lang="en-US" dirty="0"/>
           </a:p>
@@ -5446,11 +5445,7 @@
             </a:br>
             <a:r>
               <a:rPr lang="en-US" sz="2800" dirty="0" smtClean="0"/>
-              <a:t>Systems engineering Plan (SEP</a:t>
-            </a:r>
-            <a:r>
-              <a:rPr lang="en-US" sz="2800" dirty="0" smtClean="0"/>
-              <a:t>)</a:t>
+              <a:t>Systems engineering Plan (SEP)</a:t>
             </a:r>
             <a:br>
               <a:rPr lang="en-US" sz="2800" dirty="0" smtClean="0"/>
@@ -5459,10 +5454,6 @@
               <a:rPr lang="en-US" sz="2800" dirty="0" smtClean="0"/>
               <a:t>Update</a:t>
             </a:r>
-            <a:r>
-              <a:rPr lang="en-US" sz="2800" dirty="0" smtClean="0"/>
-              <a:t/>
-            </a:r>
             <a:br>
               <a:rPr lang="en-US" sz="2800" dirty="0" smtClean="0"/>
             </a:br>
@@ -5483,11 +5474,7 @@
             </a:r>
             <a:r>
               <a:rPr lang="en-US" sz="2400" dirty="0" smtClean="0"/>
-              <a:t>) </a:t>
-            </a:r>
-            <a:r>
-              <a:rPr lang="en-US" sz="2400" dirty="0" smtClean="0"/>
-              <a:t>2</a:t>
+              <a:t>) 2</a:t>
             </a:r>
             <a:endParaRPr lang="en-US" sz="2400" dirty="0"/>
           </a:p>
@@ -5573,11 +5560,7 @@
             </a:r>
             <a:r>
               <a:rPr lang="en-US" dirty="0" smtClean="0"/>
-              <a:t> Sept </a:t>
-            </a:r>
-            <a:r>
-              <a:rPr lang="en-US" dirty="0" smtClean="0"/>
-              <a:t>2012</a:t>
+              <a:t> Sept 2012</a:t>
             </a:r>
           </a:p>
           <a:p>
@@ -5861,7 +5844,33 @@
           <a:p>
             <a:r>
               <a:rPr lang="en-US" dirty="0" smtClean="0"/>
-              <a:t>xx</a:t>
+              <a:t>The system designer must consider the expected life of each component of the system relative to the life of the system.</a:t>
+            </a:r>
+          </a:p>
+          <a:p>
+            <a:r>
+              <a:rPr lang="en-US" dirty="0" smtClean="0"/>
+              <a:t>If component life is less than system life then there should be a plan for component replacement.</a:t>
+            </a:r>
+          </a:p>
+          <a:p>
+            <a:r>
+              <a:rPr lang="en-US" dirty="0" smtClean="0"/>
+              <a:t>The system plan should address obsolescence in design vs. leaving it to chance.</a:t>
+            </a:r>
+          </a:p>
+          <a:p>
+            <a:r>
+              <a:rPr lang="en-US" dirty="0" smtClean="0"/>
+              <a:t>The length of the acquisition schedule plays a role in obsolescence particularly when </a:t>
+            </a:r>
+            <a:r>
+              <a:rPr lang="en-US" smtClean="0"/>
+              <a:t>choosing rapidly </a:t>
+            </a:r>
+            <a:r>
+              <a:rPr lang="en-US" dirty="0" smtClean="0"/>
+              <a:t>moving technology.</a:t>
             </a:r>
             <a:endParaRPr lang="en-US" dirty="0" smtClean="0"/>
           </a:p>
@@ -6021,13 +6030,56 @@
         </p:nvSpPr>
         <p:spPr/>
         <p:txBody>
-          <a:bodyPr/>
+          <a:bodyPr>
+            <a:normAutofit lnSpcReduction="10000"/>
+          </a:bodyPr>
           <a:lstStyle/>
           <a:p>
             <a:r>
               <a:rPr lang="en-US" dirty="0" smtClean="0"/>
-              <a:t>xx</a:t>
-            </a:r>
+              <a:t>Manpower requirements span both operation and maintenance and s</a:t>
+            </a:r>
+            <a:r>
+              <a:rPr lang="en-US" dirty="0" smtClean="0"/>
+              <a:t>taffing quantity for both must be sufficient</a:t>
+            </a:r>
+          </a:p>
+          <a:p>
+            <a:r>
+              <a:rPr lang="en-US" dirty="0"/>
+              <a:t>A</a:t>
+            </a:r>
+            <a:r>
+              <a:rPr lang="en-US" dirty="0" smtClean="0"/>
+              <a:t>ssignments align personnel to appropriate human factors in the system, </a:t>
+            </a:r>
+            <a:r>
+              <a:rPr lang="en-US" dirty="0"/>
+              <a:t>both physical and psychological</a:t>
+            </a:r>
+            <a:endParaRPr lang="en-US" dirty="0" smtClean="0"/>
+          </a:p>
+          <a:p>
+            <a:r>
+              <a:rPr lang="en-US" dirty="0" smtClean="0"/>
+              <a:t>Skill levels are determined for all human activities</a:t>
+            </a:r>
+            <a:r>
+              <a:rPr lang="en-US" dirty="0"/>
+              <a:t> </a:t>
+            </a:r>
+            <a:r>
+              <a:rPr lang="en-US" dirty="0" smtClean="0"/>
+              <a:t>and form the basis for individual position requirements.</a:t>
+            </a:r>
+          </a:p>
+          <a:p>
+            <a:r>
+              <a:rPr lang="en-US" dirty="0" smtClean="0"/>
+              <a:t>Resources are evaluated comparing current skill level against that needed.  The difference forms the basis for training.</a:t>
+            </a:r>
+          </a:p>
+          <a:p>
             <a:endParaRPr lang="en-US" dirty="0"/>
           </a:p>
         </p:txBody>
@@ -6084,7 +6136,6 @@
               <a:rPr lang="en-US" sz="2400" dirty="0"/>
               <a:t>Conclusion/Additional Concerns</a:t>
             </a:r>
-            <a:endParaRPr lang="en-US" sz="2400" dirty="0"/>
           </a:p>
         </p:txBody>
       </p:sp>
@@ -6207,15 +6258,7 @@
             <a:pPr algn="ctr"/>
             <a:r>
               <a:rPr lang="en-US" sz="2400" u="sng" dirty="0" smtClean="0"/>
-              <a:t>IPR </a:t>
-            </a:r>
-            <a:r>
-              <a:rPr lang="en-US" sz="2400" u="sng" dirty="0" smtClean="0"/>
-              <a:t>2 </a:t>
-            </a:r>
-            <a:r>
-              <a:rPr lang="en-US" sz="2400" u="sng" dirty="0" smtClean="0"/>
-              <a:t>Agenda:</a:t>
+              <a:t>IPR 2 Agenda:</a:t>
             </a:r>
             <a:endParaRPr lang="en-US" sz="2400" u="sng" dirty="0"/>
           </a:p>
@@ -6250,13 +6293,8 @@
             </a:pPr>
             <a:r>
               <a:rPr lang="en-US" sz="1800" dirty="0" smtClean="0"/>
-              <a:t>Program Summary: </a:t>
-            </a:r>
-            <a:r>
-              <a:rPr lang="en-US" sz="1800" dirty="0" smtClean="0"/>
-              <a:t>Review</a:t>
-            </a:r>
-            <a:endParaRPr lang="en-US" sz="1800" dirty="0" smtClean="0"/>
+              <a:t>Program Summary: Review</a:t>
+            </a:r>
           </a:p>
           <a:p>
             <a:pPr>
@@ -6266,13 +6304,8 @@
             </a:pPr>
             <a:r>
               <a:rPr lang="en-US" sz="1800" dirty="0" smtClean="0"/>
-              <a:t>Design Methods for </a:t>
-            </a:r>
-            <a:r>
-              <a:rPr lang="en-US" sz="1800" dirty="0" smtClean="0"/>
-              <a:t>External/Internal Interfaces</a:t>
-            </a:r>
-            <a:endParaRPr lang="en-US" sz="1800" dirty="0" smtClean="0"/>
+              <a:t>Design Methods for External/Internal Interfaces</a:t>
+            </a:r>
           </a:p>
           <a:p>
             <a:pPr>
@@ -6284,7 +6317,6 @@
               <a:rPr lang="en-US" sz="1800" dirty="0" smtClean="0"/>
               <a:t>Test and Evaluation Strategies to Reduce Technical Risk</a:t>
             </a:r>
-            <a:endParaRPr lang="en-US" sz="1800" dirty="0" smtClean="0"/>
           </a:p>
           <a:p>
             <a:pPr>
@@ -6296,7 +6328,6 @@
               <a:rPr lang="en-US" sz="1800" dirty="0" smtClean="0"/>
               <a:t>Design of Production and Support Systems</a:t>
             </a:r>
-            <a:endParaRPr lang="en-US" sz="1800" dirty="0" smtClean="0"/>
           </a:p>
           <a:p>
             <a:pPr>
@@ -6308,7 +6339,6 @@
               <a:rPr lang="en-US" sz="1800" dirty="0" smtClean="0"/>
               <a:t>Low-Rate Initial Production (LRIP) Description</a:t>
             </a:r>
-            <a:endParaRPr lang="en-US" sz="1800" dirty="0" smtClean="0"/>
           </a:p>
           <a:p>
             <a:pPr>
@@ -6320,7 +6350,6 @@
               <a:rPr lang="en-US" sz="1800" dirty="0" smtClean="0"/>
               <a:t>Production Levels vs. Deployment Schedule</a:t>
             </a:r>
-            <a:endParaRPr lang="en-US" sz="1800" dirty="0" smtClean="0"/>
           </a:p>
           <a:p>
             <a:pPr>
@@ -6332,7 +6361,6 @@
               <a:rPr lang="en-US" sz="1800" dirty="0" smtClean="0"/>
               <a:t>Support Infrastructure vs. Deployment Schedule</a:t>
             </a:r>
-            <a:endParaRPr lang="en-US" sz="1800" dirty="0" smtClean="0"/>
           </a:p>
           <a:p>
             <a:pPr>
@@ -6344,7 +6372,6 @@
               <a:rPr lang="en-US" sz="1800" dirty="0" smtClean="0"/>
               <a:t>Management of Obsolescence Issues</a:t>
             </a:r>
-            <a:endParaRPr lang="en-US" sz="1800" dirty="0" smtClean="0"/>
           </a:p>
           <a:p>
             <a:pPr>
@@ -6356,7 +6383,6 @@
               <a:rPr lang="en-US" sz="1800" dirty="0" smtClean="0"/>
               <a:t>Training and Personnel Assignments to Support Manpower Requirements</a:t>
             </a:r>
-            <a:endParaRPr lang="en-US" sz="1800" dirty="0" smtClean="0"/>
           </a:p>
           <a:p>
             <a:pPr>
@@ -6625,15 +6651,7 @@
             <a:pPr algn="ctr"/>
             <a:r>
               <a:rPr lang="en-US" sz="2400" dirty="0" smtClean="0"/>
-              <a:t>Program </a:t>
-            </a:r>
-            <a:r>
-              <a:rPr lang="en-US" sz="2400" dirty="0" smtClean="0"/>
-              <a:t>Summary Review: </a:t>
-            </a:r>
-            <a:r>
-              <a:rPr lang="en-US" sz="2400" dirty="0" smtClean="0"/>
-              <a:t>Operational Concept description</a:t>
+              <a:t>Program Summary Review: Operational Concept description</a:t>
             </a:r>
             <a:endParaRPr lang="en-US" sz="2400" dirty="0"/>
           </a:p>
@@ -7563,7 +7581,6 @@
               <a:rPr lang="en-US" dirty="0" smtClean="0"/>
               <a:t>xx</a:t>
             </a:r>
-            <a:endParaRPr lang="en-US" dirty="0" smtClean="0"/>
           </a:p>
           <a:p>
             <a:pPr>
@@ -8971,7 +8988,7 @@
           </a:prstGeom>
           <a:noFill/>
           <a:extLst>
-            <a:ext uri="{909E8E84-426E-40DD-AFC4-6F175D3DCCD1}">
+            <a:ext uri="{909E8E84-426E-40dd-AFC4-6F175D3DCCD1}">
               <a14:hiddenFill xmlns:a14="http://schemas.microsoft.com/office/drawing/2010/main">
                 <a:solidFill>
                   <a:srgbClr val="FFFFFF"/>

</xml_diff>